<commit_message>
change property tag in css for bouton_info and for input to form.
</commit_message>
<xml_diff>
--- a/pp project1/Projet 1.pptx
+++ b/pp project1/Projet 1.pptx
@@ -176,7 +176,7 @@
           <a:noFill/>
           <a:extLst>
             <a:ext uri="{909E8E84-426E-40dd-AFC4-6F175D3DCCD1}">
-              <a14:hiddenFill xmlns:a14="http://schemas.microsoft.com/office/drawing/2010/main" xmlns="">
+              <a14:hiddenFill xmlns="" xmlns:a14="http://schemas.microsoft.com/office/drawing/2010/main">
                 <a:solidFill>
                   <a:srgbClr val="FFFFFF"/>
                 </a:solidFill>
@@ -236,7 +236,7 @@
             </a:ln>
             <a:extLst>
               <a:ext uri="{91240B29-F687-4f45-9708-019B960494DF}">
-                <a14:hiddenLine xmlns:a14="http://schemas.microsoft.com/office/drawing/2010/main" xmlns="" w="9525">
+                <a14:hiddenLine xmlns="" xmlns:a14="http://schemas.microsoft.com/office/drawing/2010/main" w="9525">
                   <a:solidFill>
                     <a:srgbClr val="000000"/>
                   </a:solidFill>
@@ -326,7 +326,7 @@
             </a:ln>
             <a:extLst>
               <a:ext uri="{91240B29-F687-4f45-9708-019B960494DF}">
-                <a14:hiddenLine xmlns:a14="http://schemas.microsoft.com/office/drawing/2010/main" xmlns="" w="9525">
+                <a14:hiddenLine xmlns="" xmlns:a14="http://schemas.microsoft.com/office/drawing/2010/main" w="9525">
                   <a:solidFill>
                     <a:srgbClr val="000000"/>
                   </a:solidFill>
@@ -416,7 +416,7 @@
             </a:ln>
             <a:extLst>
               <a:ext uri="{91240B29-F687-4f45-9708-019B960494DF}">
-                <a14:hiddenLine xmlns:a14="http://schemas.microsoft.com/office/drawing/2010/main" xmlns="" w="9525">
+                <a14:hiddenLine xmlns="" xmlns:a14="http://schemas.microsoft.com/office/drawing/2010/main" w="9525">
                   <a:solidFill>
                     <a:srgbClr val="000000"/>
                   </a:solidFill>
@@ -450,7 +450,7 @@
             </a:ln>
             <a:extLst>
               <a:ext uri="{91240B29-F687-4f45-9708-019B960494DF}">
-                <a14:hiddenLine xmlns:a14="http://schemas.microsoft.com/office/drawing/2010/main" xmlns="" w="9525">
+                <a14:hiddenLine xmlns="" xmlns:a14="http://schemas.microsoft.com/office/drawing/2010/main" w="9525">
                   <a:solidFill>
                     <a:srgbClr val="000000"/>
                   </a:solidFill>
@@ -540,7 +540,7 @@
             </a:ln>
             <a:extLst>
               <a:ext uri="{91240B29-F687-4f45-9708-019B960494DF}">
-                <a14:hiddenLine xmlns:a14="http://schemas.microsoft.com/office/drawing/2010/main" xmlns="" w="9525">
+                <a14:hiddenLine xmlns="" xmlns:a14="http://schemas.microsoft.com/office/drawing/2010/main" w="9525">
                   <a:solidFill>
                     <a:srgbClr val="000000"/>
                   </a:solidFill>
@@ -602,7 +602,7 @@
             </a:ln>
             <a:extLst>
               <a:ext uri="{91240B29-F687-4f45-9708-019B960494DF}">
-                <a14:hiddenLine xmlns:a14="http://schemas.microsoft.com/office/drawing/2010/main" xmlns="" w="9525">
+                <a14:hiddenLine xmlns="" xmlns:a14="http://schemas.microsoft.com/office/drawing/2010/main" w="9525">
                   <a:solidFill>
                     <a:srgbClr val="000000"/>
                   </a:solidFill>
@@ -664,7 +664,7 @@
             </a:ln>
             <a:extLst>
               <a:ext uri="{91240B29-F687-4f45-9708-019B960494DF}">
-                <a14:hiddenLine xmlns:a14="http://schemas.microsoft.com/office/drawing/2010/main" xmlns="" w="9525">
+                <a14:hiddenLine xmlns="" xmlns:a14="http://schemas.microsoft.com/office/drawing/2010/main" w="9525">
                   <a:solidFill>
                     <a:srgbClr val="000000"/>
                   </a:solidFill>
@@ -754,7 +754,7 @@
             </a:ln>
             <a:extLst>
               <a:ext uri="{91240B29-F687-4f45-9708-019B960494DF}">
-                <a14:hiddenLine xmlns:a14="http://schemas.microsoft.com/office/drawing/2010/main" xmlns="" w="9525">
+                <a14:hiddenLine xmlns="" xmlns:a14="http://schemas.microsoft.com/office/drawing/2010/main" w="9525">
                   <a:solidFill>
                     <a:srgbClr val="000000"/>
                   </a:solidFill>
@@ -816,7 +816,7 @@
             </a:ln>
             <a:extLst>
               <a:ext uri="{91240B29-F687-4f45-9708-019B960494DF}">
-                <a14:hiddenLine xmlns:a14="http://schemas.microsoft.com/office/drawing/2010/main" xmlns="" w="9525">
+                <a14:hiddenLine xmlns="" xmlns:a14="http://schemas.microsoft.com/office/drawing/2010/main" w="9525">
                   <a:solidFill>
                     <a:srgbClr val="000000"/>
                   </a:solidFill>
@@ -878,7 +878,7 @@
             </a:ln>
             <a:extLst>
               <a:ext uri="{91240B29-F687-4f45-9708-019B960494DF}">
-                <a14:hiddenLine xmlns:a14="http://schemas.microsoft.com/office/drawing/2010/main" xmlns="" w="9525">
+                <a14:hiddenLine xmlns="" xmlns:a14="http://schemas.microsoft.com/office/drawing/2010/main" w="9525">
                   <a:solidFill>
                     <a:srgbClr val="000000"/>
                   </a:solidFill>
@@ -968,7 +968,7 @@
             </a:ln>
             <a:extLst>
               <a:ext uri="{91240B29-F687-4f45-9708-019B960494DF}">
-                <a14:hiddenLine xmlns:a14="http://schemas.microsoft.com/office/drawing/2010/main" xmlns="" w="9525">
+                <a14:hiddenLine xmlns="" xmlns:a14="http://schemas.microsoft.com/office/drawing/2010/main" w="9525">
                   <a:solidFill>
                     <a:srgbClr val="000000"/>
                   </a:solidFill>
@@ -1058,7 +1058,7 @@
             </a:ln>
             <a:extLst>
               <a:ext uri="{91240B29-F687-4f45-9708-019B960494DF}">
-                <a14:hiddenLine xmlns:a14="http://schemas.microsoft.com/office/drawing/2010/main" xmlns="" w="9525">
+                <a14:hiddenLine xmlns="" xmlns:a14="http://schemas.microsoft.com/office/drawing/2010/main" w="9525">
                   <a:solidFill>
                     <a:srgbClr val="000000"/>
                   </a:solidFill>
@@ -1120,7 +1120,7 @@
             </a:ln>
             <a:extLst>
               <a:ext uri="{91240B29-F687-4f45-9708-019B960494DF}">
-                <a14:hiddenLine xmlns:a14="http://schemas.microsoft.com/office/drawing/2010/main" xmlns="" w="9525">
+                <a14:hiddenLine xmlns="" xmlns:a14="http://schemas.microsoft.com/office/drawing/2010/main" w="9525">
                   <a:solidFill>
                     <a:srgbClr val="000000"/>
                   </a:solidFill>
@@ -1230,7 +1230,7 @@
             </a:ln>
             <a:extLst>
               <a:ext uri="{91240B29-F687-4f45-9708-019B960494DF}">
-                <a14:hiddenLine xmlns:a14="http://schemas.microsoft.com/office/drawing/2010/main" xmlns="" w="9525">
+                <a14:hiddenLine xmlns="" xmlns:a14="http://schemas.microsoft.com/office/drawing/2010/main" w="9525">
                   <a:solidFill>
                     <a:srgbClr val="000000"/>
                   </a:solidFill>
@@ -1292,7 +1292,7 @@
             </a:ln>
             <a:extLst>
               <a:ext uri="{91240B29-F687-4f45-9708-019B960494DF}">
-                <a14:hiddenLine xmlns:a14="http://schemas.microsoft.com/office/drawing/2010/main" xmlns="" w="9525">
+                <a14:hiddenLine xmlns="" xmlns:a14="http://schemas.microsoft.com/office/drawing/2010/main" w="9525">
                   <a:solidFill>
                     <a:srgbClr val="000000"/>
                   </a:solidFill>
@@ -1382,7 +1382,7 @@
             </a:ln>
             <a:extLst>
               <a:ext uri="{91240B29-F687-4f45-9708-019B960494DF}">
-                <a14:hiddenLine xmlns:a14="http://schemas.microsoft.com/office/drawing/2010/main" xmlns="" w="9525">
+                <a14:hiddenLine xmlns="" xmlns:a14="http://schemas.microsoft.com/office/drawing/2010/main" w="9525">
                   <a:solidFill>
                     <a:srgbClr val="000000"/>
                   </a:solidFill>
@@ -1472,7 +1472,7 @@
             </a:ln>
             <a:extLst>
               <a:ext uri="{91240B29-F687-4f45-9708-019B960494DF}">
-                <a14:hiddenLine xmlns:a14="http://schemas.microsoft.com/office/drawing/2010/main" xmlns="" w="9525">
+                <a14:hiddenLine xmlns="" xmlns:a14="http://schemas.microsoft.com/office/drawing/2010/main" w="9525">
                   <a:solidFill>
                     <a:srgbClr val="000000"/>
                   </a:solidFill>
@@ -1534,7 +1534,7 @@
             </a:ln>
             <a:extLst>
               <a:ext uri="{91240B29-F687-4f45-9708-019B960494DF}">
-                <a14:hiddenLine xmlns:a14="http://schemas.microsoft.com/office/drawing/2010/main" xmlns="" w="9525">
+                <a14:hiddenLine xmlns="" xmlns:a14="http://schemas.microsoft.com/office/drawing/2010/main" w="9525">
                   <a:solidFill>
                     <a:srgbClr val="000000"/>
                   </a:solidFill>
@@ -1624,7 +1624,7 @@
             </a:ln>
             <a:extLst>
               <a:ext uri="{91240B29-F687-4f45-9708-019B960494DF}">
-                <a14:hiddenLine xmlns:a14="http://schemas.microsoft.com/office/drawing/2010/main" xmlns="" w="9525">
+                <a14:hiddenLine xmlns="" xmlns:a14="http://schemas.microsoft.com/office/drawing/2010/main" w="9525">
                   <a:solidFill>
                     <a:srgbClr val="000000"/>
                   </a:solidFill>
@@ -1714,7 +1714,7 @@
             </a:ln>
             <a:extLst>
               <a:ext uri="{91240B29-F687-4f45-9708-019B960494DF}">
-                <a14:hiddenLine xmlns:a14="http://schemas.microsoft.com/office/drawing/2010/main" xmlns="" w="9525">
+                <a14:hiddenLine xmlns="" xmlns:a14="http://schemas.microsoft.com/office/drawing/2010/main" w="9525">
                   <a:solidFill>
                     <a:srgbClr val="000000"/>
                   </a:solidFill>
@@ -1770,7 +1770,7 @@
             </a:ln>
             <a:extLst>
               <a:ext uri="{91240B29-F687-4f45-9708-019B960494DF}">
-                <a14:hiddenLine xmlns:a14="http://schemas.microsoft.com/office/drawing/2010/main" xmlns="" w="9525">
+                <a14:hiddenLine xmlns="" xmlns:a14="http://schemas.microsoft.com/office/drawing/2010/main" w="9525">
                   <a:solidFill>
                     <a:srgbClr val="000000"/>
                   </a:solidFill>
@@ -1860,7 +1860,7 @@
             </a:ln>
             <a:extLst>
               <a:ext uri="{91240B29-F687-4f45-9708-019B960494DF}">
-                <a14:hiddenLine xmlns:a14="http://schemas.microsoft.com/office/drawing/2010/main" xmlns="" w="9525">
+                <a14:hiddenLine xmlns="" xmlns:a14="http://schemas.microsoft.com/office/drawing/2010/main" w="9525">
                   <a:solidFill>
                     <a:srgbClr val="000000"/>
                   </a:solidFill>
@@ -1916,7 +1916,7 @@
             </a:ln>
             <a:extLst>
               <a:ext uri="{91240B29-F687-4f45-9708-019B960494DF}">
-                <a14:hiddenLine xmlns:a14="http://schemas.microsoft.com/office/drawing/2010/main" xmlns="" w="9525">
+                <a14:hiddenLine xmlns="" xmlns:a14="http://schemas.microsoft.com/office/drawing/2010/main" w="9525">
                   <a:solidFill>
                     <a:srgbClr val="000000"/>
                   </a:solidFill>
@@ -2006,7 +2006,7 @@
             </a:ln>
             <a:extLst>
               <a:ext uri="{91240B29-F687-4f45-9708-019B960494DF}">
-                <a14:hiddenLine xmlns:a14="http://schemas.microsoft.com/office/drawing/2010/main" xmlns="" w="9525">
+                <a14:hiddenLine xmlns="" xmlns:a14="http://schemas.microsoft.com/office/drawing/2010/main" w="9525">
                   <a:solidFill>
                     <a:srgbClr val="000000"/>
                   </a:solidFill>
@@ -2074,7 +2074,7 @@
             </a:ln>
             <a:extLst>
               <a:ext uri="{91240B29-F687-4f45-9708-019B960494DF}">
-                <a14:hiddenLine xmlns:a14="http://schemas.microsoft.com/office/drawing/2010/main" xmlns="" w="9525">
+                <a14:hiddenLine xmlns="" xmlns:a14="http://schemas.microsoft.com/office/drawing/2010/main" w="9525">
                   <a:solidFill>
                     <a:srgbClr val="000000"/>
                   </a:solidFill>
@@ -2164,7 +2164,7 @@
             </a:ln>
             <a:extLst>
               <a:ext uri="{91240B29-F687-4f45-9708-019B960494DF}">
-                <a14:hiddenLine xmlns:a14="http://schemas.microsoft.com/office/drawing/2010/main" xmlns="" w="9525">
+                <a14:hiddenLine xmlns="" xmlns:a14="http://schemas.microsoft.com/office/drawing/2010/main" w="9525">
                   <a:solidFill>
                     <a:srgbClr val="000000"/>
                   </a:solidFill>
@@ -2232,7 +2232,7 @@
             </a:ln>
             <a:extLst>
               <a:ext uri="{91240B29-F687-4f45-9708-019B960494DF}">
-                <a14:hiddenLine xmlns:a14="http://schemas.microsoft.com/office/drawing/2010/main" xmlns="" w="9525">
+                <a14:hiddenLine xmlns="" xmlns:a14="http://schemas.microsoft.com/office/drawing/2010/main" w="9525">
                   <a:solidFill>
                     <a:srgbClr val="000000"/>
                   </a:solidFill>
@@ -2322,7 +2322,7 @@
             </a:ln>
             <a:extLst>
               <a:ext uri="{91240B29-F687-4f45-9708-019B960494DF}">
-                <a14:hiddenLine xmlns:a14="http://schemas.microsoft.com/office/drawing/2010/main" xmlns="" w="9525">
+                <a14:hiddenLine xmlns="" xmlns:a14="http://schemas.microsoft.com/office/drawing/2010/main" w="9525">
                   <a:solidFill>
                     <a:srgbClr val="000000"/>
                   </a:solidFill>
@@ -2356,7 +2356,7 @@
             </a:ln>
             <a:extLst>
               <a:ext uri="{91240B29-F687-4f45-9708-019B960494DF}">
-                <a14:hiddenLine xmlns:a14="http://schemas.microsoft.com/office/drawing/2010/main" xmlns="" w="9525">
+                <a14:hiddenLine xmlns="" xmlns:a14="http://schemas.microsoft.com/office/drawing/2010/main" w="9525">
                   <a:solidFill>
                     <a:srgbClr val="000000"/>
                   </a:solidFill>
@@ -2446,7 +2446,7 @@
             </a:ln>
             <a:extLst>
               <a:ext uri="{91240B29-F687-4f45-9708-019B960494DF}">
-                <a14:hiddenLine xmlns:a14="http://schemas.microsoft.com/office/drawing/2010/main" xmlns="" w="9525">
+                <a14:hiddenLine xmlns="" xmlns:a14="http://schemas.microsoft.com/office/drawing/2010/main" w="9525">
                   <a:solidFill>
                     <a:srgbClr val="000000"/>
                   </a:solidFill>
@@ -2508,7 +2508,7 @@
             </a:ln>
             <a:extLst>
               <a:ext uri="{91240B29-F687-4f45-9708-019B960494DF}">
-                <a14:hiddenLine xmlns:a14="http://schemas.microsoft.com/office/drawing/2010/main" xmlns="" w="9525">
+                <a14:hiddenLine xmlns="" xmlns:a14="http://schemas.microsoft.com/office/drawing/2010/main" w="9525">
                   <a:solidFill>
                     <a:srgbClr val="000000"/>
                   </a:solidFill>
@@ -2570,7 +2570,7 @@
             </a:ln>
             <a:extLst>
               <a:ext uri="{91240B29-F687-4f45-9708-019B960494DF}">
-                <a14:hiddenLine xmlns:a14="http://schemas.microsoft.com/office/drawing/2010/main" xmlns="" w="9525">
+                <a14:hiddenLine xmlns="" xmlns:a14="http://schemas.microsoft.com/office/drawing/2010/main" w="9525">
                   <a:solidFill>
                     <a:srgbClr val="000000"/>
                   </a:solidFill>
@@ -2660,7 +2660,7 @@
             </a:ln>
             <a:extLst>
               <a:ext uri="{91240B29-F687-4f45-9708-019B960494DF}">
-                <a14:hiddenLine xmlns:a14="http://schemas.microsoft.com/office/drawing/2010/main" xmlns="" w="9525">
+                <a14:hiddenLine xmlns="" xmlns:a14="http://schemas.microsoft.com/office/drawing/2010/main" w="9525">
                   <a:solidFill>
                     <a:srgbClr val="000000"/>
                   </a:solidFill>
@@ -2728,7 +2728,7 @@
             </a:ln>
             <a:extLst>
               <a:ext uri="{91240B29-F687-4f45-9708-019B960494DF}">
-                <a14:hiddenLine xmlns:a14="http://schemas.microsoft.com/office/drawing/2010/main" xmlns="" w="9525">
+                <a14:hiddenLine xmlns="" xmlns:a14="http://schemas.microsoft.com/office/drawing/2010/main" w="9525">
                   <a:solidFill>
                     <a:srgbClr val="000000"/>
                   </a:solidFill>
@@ -2790,7 +2790,7 @@
             </a:ln>
             <a:extLst>
               <a:ext uri="{91240B29-F687-4f45-9708-019B960494DF}">
-                <a14:hiddenLine xmlns:a14="http://schemas.microsoft.com/office/drawing/2010/main" xmlns="" w="9525">
+                <a14:hiddenLine xmlns="" xmlns:a14="http://schemas.microsoft.com/office/drawing/2010/main" w="9525">
                   <a:solidFill>
                     <a:srgbClr val="000000"/>
                   </a:solidFill>
@@ -2880,7 +2880,7 @@
             </a:ln>
             <a:extLst>
               <a:ext uri="{91240B29-F687-4f45-9708-019B960494DF}">
-                <a14:hiddenLine xmlns:a14="http://schemas.microsoft.com/office/drawing/2010/main" xmlns="" w="9525">
+                <a14:hiddenLine xmlns="" xmlns:a14="http://schemas.microsoft.com/office/drawing/2010/main" w="9525">
                   <a:solidFill>
                     <a:srgbClr val="000000"/>
                   </a:solidFill>
@@ -2942,7 +2942,7 @@
             </a:ln>
             <a:extLst>
               <a:ext uri="{91240B29-F687-4f45-9708-019B960494DF}">
-                <a14:hiddenLine xmlns:a14="http://schemas.microsoft.com/office/drawing/2010/main" xmlns="" w="9525">
+                <a14:hiddenLine xmlns="" xmlns:a14="http://schemas.microsoft.com/office/drawing/2010/main" w="9525">
                   <a:solidFill>
                     <a:srgbClr val="000000"/>
                   </a:solidFill>
@@ -3032,7 +3032,7 @@
             </a:ln>
             <a:extLst>
               <a:ext uri="{91240B29-F687-4f45-9708-019B960494DF}">
-                <a14:hiddenLine xmlns:a14="http://schemas.microsoft.com/office/drawing/2010/main" xmlns="" w="9525">
+                <a14:hiddenLine xmlns="" xmlns:a14="http://schemas.microsoft.com/office/drawing/2010/main" w="9525">
                   <a:solidFill>
                     <a:srgbClr val="000000"/>
                   </a:solidFill>
@@ -3094,7 +3094,7 @@
             </a:ln>
             <a:extLst>
               <a:ext uri="{91240B29-F687-4f45-9708-019B960494DF}">
-                <a14:hiddenLine xmlns:a14="http://schemas.microsoft.com/office/drawing/2010/main" xmlns="" w="9525">
+                <a14:hiddenLine xmlns="" xmlns:a14="http://schemas.microsoft.com/office/drawing/2010/main" w="9525">
                   <a:solidFill>
                     <a:srgbClr val="000000"/>
                   </a:solidFill>
@@ -3184,7 +3184,7 @@
             </a:ln>
             <a:extLst>
               <a:ext uri="{91240B29-F687-4f45-9708-019B960494DF}">
-                <a14:hiddenLine xmlns:a14="http://schemas.microsoft.com/office/drawing/2010/main" xmlns="" w="9525">
+                <a14:hiddenLine xmlns="" xmlns:a14="http://schemas.microsoft.com/office/drawing/2010/main" w="9525">
                   <a:solidFill>
                     <a:srgbClr val="000000"/>
                   </a:solidFill>
@@ -3218,7 +3218,7 @@
             </a:ln>
             <a:extLst>
               <a:ext uri="{91240B29-F687-4f45-9708-019B960494DF}">
-                <a14:hiddenLine xmlns:a14="http://schemas.microsoft.com/office/drawing/2010/main" xmlns="" w="9525">
+                <a14:hiddenLine xmlns="" xmlns:a14="http://schemas.microsoft.com/office/drawing/2010/main" w="9525">
                   <a:solidFill>
                     <a:srgbClr val="000000"/>
                   </a:solidFill>
@@ -3283,7 +3283,7 @@
             </a:ln>
             <a:extLst>
               <a:ext uri="{91240B29-F687-4f45-9708-019B960494DF}">
-                <a14:hiddenLine xmlns:a14="http://schemas.microsoft.com/office/drawing/2010/main" xmlns="" w="9525">
+                <a14:hiddenLine xmlns="" xmlns:a14="http://schemas.microsoft.com/office/drawing/2010/main" w="9525">
                   <a:solidFill>
                     <a:srgbClr val="000000"/>
                   </a:solidFill>
@@ -3373,7 +3373,7 @@
             </a:ln>
             <a:extLst>
               <a:ext uri="{91240B29-F687-4f45-9708-019B960494DF}">
-                <a14:hiddenLine xmlns:a14="http://schemas.microsoft.com/office/drawing/2010/main" xmlns="" w="9525">
+                <a14:hiddenLine xmlns="" xmlns:a14="http://schemas.microsoft.com/office/drawing/2010/main" w="9525">
                   <a:solidFill>
                     <a:srgbClr val="000000"/>
                   </a:solidFill>
@@ -3435,7 +3435,7 @@
             </a:ln>
             <a:extLst>
               <a:ext uri="{91240B29-F687-4f45-9708-019B960494DF}">
-                <a14:hiddenLine xmlns:a14="http://schemas.microsoft.com/office/drawing/2010/main" xmlns="" w="9525">
+                <a14:hiddenLine xmlns="" xmlns:a14="http://schemas.microsoft.com/office/drawing/2010/main" w="9525">
                   <a:solidFill>
                     <a:srgbClr val="000000"/>
                   </a:solidFill>
@@ -3525,7 +3525,7 @@
             </a:ln>
             <a:extLst>
               <a:ext uri="{91240B29-F687-4f45-9708-019B960494DF}">
-                <a14:hiddenLine xmlns:a14="http://schemas.microsoft.com/office/drawing/2010/main" xmlns="" w="9525">
+                <a14:hiddenLine xmlns="" xmlns:a14="http://schemas.microsoft.com/office/drawing/2010/main" w="9525">
                   <a:solidFill>
                     <a:srgbClr val="000000"/>
                   </a:solidFill>
@@ -3615,7 +3615,7 @@
             </a:ln>
             <a:extLst>
               <a:ext uri="{91240B29-F687-4f45-9708-019B960494DF}">
-                <a14:hiddenLine xmlns:a14="http://schemas.microsoft.com/office/drawing/2010/main" xmlns="" w="9525">
+                <a14:hiddenLine xmlns="" xmlns:a14="http://schemas.microsoft.com/office/drawing/2010/main" w="9525">
                   <a:solidFill>
                     <a:srgbClr val="000000"/>
                   </a:solidFill>
@@ -3680,7 +3680,7 @@
             </a:ln>
             <a:extLst>
               <a:ext uri="{91240B29-F687-4f45-9708-019B960494DF}">
-                <a14:hiddenLine xmlns:a14="http://schemas.microsoft.com/office/drawing/2010/main" xmlns="" w="9525">
+                <a14:hiddenLine xmlns="" xmlns:a14="http://schemas.microsoft.com/office/drawing/2010/main" w="9525">
                   <a:solidFill>
                     <a:srgbClr val="000000"/>
                   </a:solidFill>
@@ -3742,7 +3742,7 @@
             </a:ln>
             <a:extLst>
               <a:ext uri="{91240B29-F687-4f45-9708-019B960494DF}">
-                <a14:hiddenLine xmlns:a14="http://schemas.microsoft.com/office/drawing/2010/main" xmlns="" w="9525">
+                <a14:hiddenLine xmlns="" xmlns:a14="http://schemas.microsoft.com/office/drawing/2010/main" w="9525">
                   <a:solidFill>
                     <a:srgbClr val="000000"/>
                   </a:solidFill>
@@ -3832,7 +3832,7 @@
             </a:ln>
             <a:extLst>
               <a:ext uri="{91240B29-F687-4f45-9708-019B960494DF}">
-                <a14:hiddenLine xmlns:a14="http://schemas.microsoft.com/office/drawing/2010/main" xmlns="" w="9525">
+                <a14:hiddenLine xmlns="" xmlns:a14="http://schemas.microsoft.com/office/drawing/2010/main" w="9525">
                   <a:solidFill>
                     <a:srgbClr val="000000"/>
                   </a:solidFill>
@@ -3922,7 +3922,7 @@
             </a:ln>
             <a:extLst>
               <a:ext uri="{91240B29-F687-4f45-9708-019B960494DF}">
-                <a14:hiddenLine xmlns:a14="http://schemas.microsoft.com/office/drawing/2010/main" xmlns="" w="9525">
+                <a14:hiddenLine xmlns="" xmlns:a14="http://schemas.microsoft.com/office/drawing/2010/main" w="9525">
                   <a:solidFill>
                     <a:srgbClr val="000000"/>
                   </a:solidFill>
@@ -3984,7 +3984,7 @@
             </a:ln>
             <a:extLst>
               <a:ext uri="{91240B29-F687-4f45-9708-019B960494DF}">
-                <a14:hiddenLine xmlns:a14="http://schemas.microsoft.com/office/drawing/2010/main" xmlns="" w="9525">
+                <a14:hiddenLine xmlns="" xmlns:a14="http://schemas.microsoft.com/office/drawing/2010/main" w="9525">
                   <a:solidFill>
                     <a:srgbClr val="000000"/>
                   </a:solidFill>
@@ -4104,7 +4104,7 @@
             </a:ln>
             <a:extLst>
               <a:ext uri="{91240B29-F687-4f45-9708-019B960494DF}">
-                <a14:hiddenLine xmlns:a14="http://schemas.microsoft.com/office/drawing/2010/main" xmlns="" w="9525">
+                <a14:hiddenLine xmlns="" xmlns:a14="http://schemas.microsoft.com/office/drawing/2010/main" w="9525">
                   <a:solidFill>
                     <a:srgbClr val="000000"/>
                   </a:solidFill>
@@ -4172,7 +4172,7 @@
             </a:ln>
             <a:extLst>
               <a:ext uri="{91240B29-F687-4f45-9708-019B960494DF}">
-                <a14:hiddenLine xmlns:a14="http://schemas.microsoft.com/office/drawing/2010/main" xmlns="" w="9525">
+                <a14:hiddenLine xmlns="" xmlns:a14="http://schemas.microsoft.com/office/drawing/2010/main" w="9525">
                   <a:solidFill>
                     <a:srgbClr val="000000"/>
                   </a:solidFill>
@@ -4262,7 +4262,7 @@
             </a:ln>
             <a:extLst>
               <a:ext uri="{91240B29-F687-4f45-9708-019B960494DF}">
-                <a14:hiddenLine xmlns:a14="http://schemas.microsoft.com/office/drawing/2010/main" xmlns="" w="9525">
+                <a14:hiddenLine xmlns="" xmlns:a14="http://schemas.microsoft.com/office/drawing/2010/main" w="9525">
                   <a:solidFill>
                     <a:srgbClr val="000000"/>
                   </a:solidFill>
@@ -4402,7 +4402,7 @@
           <a:p>
             <a:fld id="{48A87A34-81AB-432B-8DAE-1953F412C126}" type="datetimeFigureOut">
               <a:rPr lang="en-US" dirty="0"/>
-              <a:t>2/9/2018</a:t>
+              <a:t>2/12/2018</a:t>
             </a:fld>
             <a:endParaRPr lang="en-US" dirty="0"/>
           </a:p>
@@ -4664,7 +4664,7 @@
           <a:p>
             <a:fld id="{48A87A34-81AB-432B-8DAE-1953F412C126}" type="datetimeFigureOut">
               <a:rPr lang="en-US" dirty="0"/>
-              <a:t>2/9/2018</a:t>
+              <a:t>2/12/2018</a:t>
             </a:fld>
             <a:endParaRPr lang="en-US" dirty="0"/>
           </a:p>
@@ -4855,7 +4855,7 @@
           <a:p>
             <a:fld id="{48A87A34-81AB-432B-8DAE-1953F412C126}" type="datetimeFigureOut">
               <a:rPr lang="en-US" dirty="0"/>
-              <a:t>2/9/2018</a:t>
+              <a:t>2/12/2018</a:t>
             </a:fld>
             <a:endParaRPr lang="en-US" dirty="0"/>
           </a:p>
@@ -5113,7 +5113,7 @@
           <a:p>
             <a:fld id="{48A87A34-81AB-432B-8DAE-1953F412C126}" type="datetimeFigureOut">
               <a:rPr lang="en-US" dirty="0"/>
-              <a:t>2/9/2018</a:t>
+              <a:t>2/12/2018</a:t>
             </a:fld>
             <a:endParaRPr lang="en-US" dirty="0"/>
           </a:p>
@@ -5542,7 +5542,7 @@
           <a:p>
             <a:fld id="{48A87A34-81AB-432B-8DAE-1953F412C126}" type="datetimeFigureOut">
               <a:rPr lang="en-US" dirty="0"/>
-              <a:t>2/9/2018</a:t>
+              <a:t>2/12/2018</a:t>
             </a:fld>
             <a:endParaRPr lang="en-US" dirty="0"/>
           </a:p>
@@ -6083,7 +6083,7 @@
           <a:p>
             <a:fld id="{48A87A34-81AB-432B-8DAE-1953F412C126}" type="datetimeFigureOut">
               <a:rPr lang="en-US" dirty="0"/>
-              <a:t>2/9/2018</a:t>
+              <a:t>2/12/2018</a:t>
             </a:fld>
             <a:endParaRPr lang="en-US" dirty="0"/>
           </a:p>
@@ -6798,7 +6798,7 @@
           <a:p>
             <a:fld id="{48A87A34-81AB-432B-8DAE-1953F412C126}" type="datetimeFigureOut">
               <a:rPr lang="en-US" dirty="0"/>
-              <a:t>2/9/2018</a:t>
+              <a:t>2/12/2018</a:t>
             </a:fld>
             <a:endParaRPr lang="en-US" dirty="0"/>
           </a:p>
@@ -6963,7 +6963,7 @@
           <a:p>
             <a:fld id="{48A87A34-81AB-432B-8DAE-1953F412C126}" type="datetimeFigureOut">
               <a:rPr lang="en-US" dirty="0"/>
-              <a:t>2/9/2018</a:t>
+              <a:t>2/12/2018</a:t>
             </a:fld>
             <a:endParaRPr lang="en-US" dirty="0"/>
           </a:p>
@@ -7138,7 +7138,7 @@
           <a:p>
             <a:fld id="{48A87A34-81AB-432B-8DAE-1953F412C126}" type="datetimeFigureOut">
               <a:rPr lang="en-US" dirty="0"/>
-              <a:t>2/9/2018</a:t>
+              <a:t>2/12/2018</a:t>
             </a:fld>
             <a:endParaRPr lang="en-US" dirty="0"/>
           </a:p>
@@ -7303,7 +7303,7 @@
           <a:p>
             <a:fld id="{48A87A34-81AB-432B-8DAE-1953F412C126}" type="datetimeFigureOut">
               <a:rPr lang="en-US" dirty="0"/>
-              <a:t>2/9/2018</a:t>
+              <a:t>2/12/2018</a:t>
             </a:fld>
             <a:endParaRPr lang="en-US" dirty="0"/>
           </a:p>
@@ -7548,7 +7548,7 @@
           <a:p>
             <a:fld id="{48A87A34-81AB-432B-8DAE-1953F412C126}" type="datetimeFigureOut">
               <a:rPr lang="en-US" dirty="0"/>
-              <a:t>2/9/2018</a:t>
+              <a:t>2/12/2018</a:t>
             </a:fld>
             <a:endParaRPr lang="en-US" dirty="0"/>
           </a:p>
@@ -7775,7 +7775,7 @@
           <a:p>
             <a:fld id="{48A87A34-81AB-432B-8DAE-1953F412C126}" type="datetimeFigureOut">
               <a:rPr lang="en-US" dirty="0"/>
-              <a:t>2/9/2018</a:t>
+              <a:t>2/12/2018</a:t>
             </a:fld>
             <a:endParaRPr lang="en-US" dirty="0"/>
           </a:p>
@@ -8151,7 +8151,7 @@
           <a:p>
             <a:fld id="{48A87A34-81AB-432B-8DAE-1953F412C126}" type="datetimeFigureOut">
               <a:rPr lang="en-US" dirty="0"/>
-              <a:t>2/9/2018</a:t>
+              <a:t>2/12/2018</a:t>
             </a:fld>
             <a:endParaRPr lang="en-US" dirty="0"/>
           </a:p>
@@ -8264,7 +8264,7 @@
           <a:p>
             <a:fld id="{48A87A34-81AB-432B-8DAE-1953F412C126}" type="datetimeFigureOut">
               <a:rPr lang="en-US" dirty="0"/>
-              <a:t>2/9/2018</a:t>
+              <a:t>2/12/2018</a:t>
             </a:fld>
             <a:endParaRPr lang="en-US" dirty="0"/>
           </a:p>
@@ -8354,7 +8354,7 @@
           <a:p>
             <a:fld id="{48A87A34-81AB-432B-8DAE-1953F412C126}" type="datetimeFigureOut">
               <a:rPr lang="en-US" dirty="0"/>
-              <a:t>2/9/2018</a:t>
+              <a:t>2/12/2018</a:t>
             </a:fld>
             <a:endParaRPr lang="en-US" dirty="0"/>
           </a:p>
@@ -8598,7 +8598,7 @@
           <a:p>
             <a:fld id="{48A87A34-81AB-432B-8DAE-1953F412C126}" type="datetimeFigureOut">
               <a:rPr lang="en-US" dirty="0"/>
-              <a:t>2/9/2018</a:t>
+              <a:t>2/12/2018</a:t>
             </a:fld>
             <a:endParaRPr lang="en-US" dirty="0"/>
           </a:p>
@@ -8873,7 +8873,7 @@
           <a:p>
             <a:fld id="{48A87A34-81AB-432B-8DAE-1953F412C126}" type="datetimeFigureOut">
               <a:rPr lang="en-US" dirty="0"/>
-              <a:t>2/9/2018</a:t>
+              <a:t>2/12/2018</a:t>
             </a:fld>
             <a:endParaRPr lang="en-US" dirty="0"/>
           </a:p>
@@ -8984,7 +8984,7 @@
           <a:noFill/>
           <a:extLst>
             <a:ext uri="{909E8E84-426E-40dd-AFC4-6F175D3DCCD1}">
-              <a14:hiddenFill xmlns:a14="http://schemas.microsoft.com/office/drawing/2010/main" xmlns="">
+              <a14:hiddenFill xmlns="" xmlns:a14="http://schemas.microsoft.com/office/drawing/2010/main">
                 <a:solidFill>
                   <a:srgbClr val="FFFFFF"/>
                 </a:solidFill>
@@ -9058,7 +9058,7 @@
               </a:ln>
               <a:extLst>
                 <a:ext uri="{91240B29-F687-4f45-9708-019B960494DF}">
-                  <a14:hiddenLine xmlns:a14="http://schemas.microsoft.com/office/drawing/2010/main" xmlns="" w="9525">
+                  <a14:hiddenLine xmlns="" xmlns:a14="http://schemas.microsoft.com/office/drawing/2010/main" w="9525">
                     <a:solidFill>
                       <a:srgbClr val="000000"/>
                     </a:solidFill>
@@ -9148,7 +9148,7 @@
               </a:ln>
               <a:extLst>
                 <a:ext uri="{91240B29-F687-4f45-9708-019B960494DF}">
-                  <a14:hiddenLine xmlns:a14="http://schemas.microsoft.com/office/drawing/2010/main" xmlns="" w="9525">
+                  <a14:hiddenLine xmlns="" xmlns:a14="http://schemas.microsoft.com/office/drawing/2010/main" w="9525">
                     <a:solidFill>
                       <a:srgbClr val="000000"/>
                     </a:solidFill>
@@ -9238,7 +9238,7 @@
               </a:ln>
               <a:extLst>
                 <a:ext uri="{91240B29-F687-4f45-9708-019B960494DF}">
-                  <a14:hiddenLine xmlns:a14="http://schemas.microsoft.com/office/drawing/2010/main" xmlns="" w="9525">
+                  <a14:hiddenLine xmlns="" xmlns:a14="http://schemas.microsoft.com/office/drawing/2010/main" w="9525">
                     <a:solidFill>
                       <a:srgbClr val="000000"/>
                     </a:solidFill>
@@ -9300,7 +9300,7 @@
               </a:ln>
               <a:extLst>
                 <a:ext uri="{91240B29-F687-4f45-9708-019B960494DF}">
-                  <a14:hiddenLine xmlns:a14="http://schemas.microsoft.com/office/drawing/2010/main" xmlns="" w="9525">
+                  <a14:hiddenLine xmlns="" xmlns:a14="http://schemas.microsoft.com/office/drawing/2010/main" w="9525">
                     <a:solidFill>
                       <a:srgbClr val="000000"/>
                     </a:solidFill>
@@ -9390,7 +9390,7 @@
               </a:ln>
               <a:extLst>
                 <a:ext uri="{91240B29-F687-4f45-9708-019B960494DF}">
-                  <a14:hiddenLine xmlns:a14="http://schemas.microsoft.com/office/drawing/2010/main" xmlns="" w="9525">
+                  <a14:hiddenLine xmlns="" xmlns:a14="http://schemas.microsoft.com/office/drawing/2010/main" w="9525">
                     <a:solidFill>
                       <a:srgbClr val="000000"/>
                     </a:solidFill>
@@ -9452,7 +9452,7 @@
               </a:ln>
               <a:extLst>
                 <a:ext uri="{91240B29-F687-4f45-9708-019B960494DF}">
-                  <a14:hiddenLine xmlns:a14="http://schemas.microsoft.com/office/drawing/2010/main" xmlns="" w="9525">
+                  <a14:hiddenLine xmlns="" xmlns:a14="http://schemas.microsoft.com/office/drawing/2010/main" w="9525">
                     <a:solidFill>
                       <a:srgbClr val="000000"/>
                     </a:solidFill>
@@ -9514,7 +9514,7 @@
               </a:ln>
               <a:extLst>
                 <a:ext uri="{91240B29-F687-4f45-9708-019B960494DF}">
-                  <a14:hiddenLine xmlns:a14="http://schemas.microsoft.com/office/drawing/2010/main" xmlns="" w="9525">
+                  <a14:hiddenLine xmlns="" xmlns:a14="http://schemas.microsoft.com/office/drawing/2010/main" w="9525">
                     <a:solidFill>
                       <a:srgbClr val="000000"/>
                     </a:solidFill>
@@ -9604,7 +9604,7 @@
               </a:ln>
               <a:extLst>
                 <a:ext uri="{91240B29-F687-4f45-9708-019B960494DF}">
-                  <a14:hiddenLine xmlns:a14="http://schemas.microsoft.com/office/drawing/2010/main" xmlns="" w="9525">
+                  <a14:hiddenLine xmlns="" xmlns:a14="http://schemas.microsoft.com/office/drawing/2010/main" w="9525">
                     <a:solidFill>
                       <a:srgbClr val="000000"/>
                     </a:solidFill>
@@ -9694,7 +9694,7 @@
               </a:ln>
               <a:extLst>
                 <a:ext uri="{91240B29-F687-4f45-9708-019B960494DF}">
-                  <a14:hiddenLine xmlns:a14="http://schemas.microsoft.com/office/drawing/2010/main" xmlns="" w="9525">
+                  <a14:hiddenLine xmlns="" xmlns:a14="http://schemas.microsoft.com/office/drawing/2010/main" w="9525">
                     <a:solidFill>
                       <a:srgbClr val="000000"/>
                     </a:solidFill>
@@ -9756,7 +9756,7 @@
               </a:ln>
               <a:extLst>
                 <a:ext uri="{91240B29-F687-4f45-9708-019B960494DF}">
-                  <a14:hiddenLine xmlns:a14="http://schemas.microsoft.com/office/drawing/2010/main" xmlns="" w="9525">
+                  <a14:hiddenLine xmlns="" xmlns:a14="http://schemas.microsoft.com/office/drawing/2010/main" w="9525">
                     <a:solidFill>
                       <a:srgbClr val="000000"/>
                     </a:solidFill>
@@ -9866,7 +9866,7 @@
               </a:ln>
               <a:extLst>
                 <a:ext uri="{91240B29-F687-4f45-9708-019B960494DF}">
-                  <a14:hiddenLine xmlns:a14="http://schemas.microsoft.com/office/drawing/2010/main" xmlns="" w="9525">
+                  <a14:hiddenLine xmlns="" xmlns:a14="http://schemas.microsoft.com/office/drawing/2010/main" w="9525">
                     <a:solidFill>
                       <a:srgbClr val="000000"/>
                     </a:solidFill>
@@ -9950,7 +9950,7 @@
               </a:ln>
               <a:extLst>
                 <a:ext uri="{91240B29-F687-4f45-9708-019B960494DF}">
-                  <a14:hiddenLine xmlns:a14="http://schemas.microsoft.com/office/drawing/2010/main" xmlns="" w="9525">
+                  <a14:hiddenLine xmlns="" xmlns:a14="http://schemas.microsoft.com/office/drawing/2010/main" w="9525">
                     <a:solidFill>
                       <a:srgbClr val="000000"/>
                     </a:solidFill>
@@ -10012,7 +10012,7 @@
               </a:ln>
               <a:extLst>
                 <a:ext uri="{91240B29-F687-4f45-9708-019B960494DF}">
-                  <a14:hiddenLine xmlns:a14="http://schemas.microsoft.com/office/drawing/2010/main" xmlns="" w="9525">
+                  <a14:hiddenLine xmlns="" xmlns:a14="http://schemas.microsoft.com/office/drawing/2010/main" w="9525">
                     <a:solidFill>
                       <a:srgbClr val="000000"/>
                     </a:solidFill>
@@ -10074,7 +10074,7 @@
               </a:ln>
               <a:extLst>
                 <a:ext uri="{91240B29-F687-4f45-9708-019B960494DF}">
-                  <a14:hiddenLine xmlns:a14="http://schemas.microsoft.com/office/drawing/2010/main" xmlns="" w="9525">
+                  <a14:hiddenLine xmlns="" xmlns:a14="http://schemas.microsoft.com/office/drawing/2010/main" w="9525">
                     <a:solidFill>
                       <a:srgbClr val="000000"/>
                     </a:solidFill>
@@ -10164,7 +10164,7 @@
               </a:ln>
               <a:extLst>
                 <a:ext uri="{91240B29-F687-4f45-9708-019B960494DF}">
-                  <a14:hiddenLine xmlns:a14="http://schemas.microsoft.com/office/drawing/2010/main" xmlns="" w="9525">
+                  <a14:hiddenLine xmlns="" xmlns:a14="http://schemas.microsoft.com/office/drawing/2010/main" w="9525">
                     <a:solidFill>
                       <a:srgbClr val="000000"/>
                     </a:solidFill>
@@ -10198,7 +10198,7 @@
               </a:ln>
               <a:extLst>
                 <a:ext uri="{91240B29-F687-4f45-9708-019B960494DF}">
-                  <a14:hiddenLine xmlns:a14="http://schemas.microsoft.com/office/drawing/2010/main" xmlns="" w="9525">
+                  <a14:hiddenLine xmlns="" xmlns:a14="http://schemas.microsoft.com/office/drawing/2010/main" w="9525">
                     <a:solidFill>
                       <a:srgbClr val="000000"/>
                     </a:solidFill>
@@ -10263,7 +10263,7 @@
               </a:ln>
               <a:extLst>
                 <a:ext uri="{91240B29-F687-4f45-9708-019B960494DF}">
-                  <a14:hiddenLine xmlns:a14="http://schemas.microsoft.com/office/drawing/2010/main" xmlns="" w="9525">
+                  <a14:hiddenLine xmlns="" xmlns:a14="http://schemas.microsoft.com/office/drawing/2010/main" w="9525">
                     <a:solidFill>
                       <a:srgbClr val="000000"/>
                     </a:solidFill>
@@ -10353,7 +10353,7 @@
               </a:ln>
               <a:extLst>
                 <a:ext uri="{91240B29-F687-4f45-9708-019B960494DF}">
-                  <a14:hiddenLine xmlns:a14="http://schemas.microsoft.com/office/drawing/2010/main" xmlns="" w="9525">
+                  <a14:hiddenLine xmlns="" xmlns:a14="http://schemas.microsoft.com/office/drawing/2010/main" w="9525">
                     <a:solidFill>
                       <a:srgbClr val="000000"/>
                     </a:solidFill>
@@ -10415,7 +10415,7 @@
               </a:ln>
               <a:extLst>
                 <a:ext uri="{91240B29-F687-4f45-9708-019B960494DF}">
-                  <a14:hiddenLine xmlns:a14="http://schemas.microsoft.com/office/drawing/2010/main" xmlns="" w="9525">
+                  <a14:hiddenLine xmlns="" xmlns:a14="http://schemas.microsoft.com/office/drawing/2010/main" w="9525">
                     <a:solidFill>
                       <a:srgbClr val="000000"/>
                     </a:solidFill>
@@ -10505,7 +10505,7 @@
               </a:ln>
               <a:extLst>
                 <a:ext uri="{91240B29-F687-4f45-9708-019B960494DF}">
-                  <a14:hiddenLine xmlns:a14="http://schemas.microsoft.com/office/drawing/2010/main" xmlns="" w="9525">
+                  <a14:hiddenLine xmlns="" xmlns:a14="http://schemas.microsoft.com/office/drawing/2010/main" w="9525">
                     <a:solidFill>
                       <a:srgbClr val="000000"/>
                     </a:solidFill>
@@ -10570,7 +10570,7 @@
               </a:ln>
               <a:extLst>
                 <a:ext uri="{91240B29-F687-4f45-9708-019B960494DF}">
-                  <a14:hiddenLine xmlns:a14="http://schemas.microsoft.com/office/drawing/2010/main" xmlns="" w="9525">
+                  <a14:hiddenLine xmlns="" xmlns:a14="http://schemas.microsoft.com/office/drawing/2010/main" w="9525">
                     <a:solidFill>
                       <a:srgbClr val="000000"/>
                     </a:solidFill>
@@ -10632,7 +10632,7 @@
               </a:ln>
               <a:extLst>
                 <a:ext uri="{91240B29-F687-4f45-9708-019B960494DF}">
-                  <a14:hiddenLine xmlns:a14="http://schemas.microsoft.com/office/drawing/2010/main" xmlns="" w="9525">
+                  <a14:hiddenLine xmlns="" xmlns:a14="http://schemas.microsoft.com/office/drawing/2010/main" w="9525">
                     <a:solidFill>
                       <a:srgbClr val="000000"/>
                     </a:solidFill>
@@ -10722,7 +10722,7 @@
               </a:ln>
               <a:extLst>
                 <a:ext uri="{91240B29-F687-4f45-9708-019B960494DF}">
-                  <a14:hiddenLine xmlns:a14="http://schemas.microsoft.com/office/drawing/2010/main" xmlns="" w="9525">
+                  <a14:hiddenLine xmlns="" xmlns:a14="http://schemas.microsoft.com/office/drawing/2010/main" w="9525">
                     <a:solidFill>
                       <a:srgbClr val="000000"/>
                     </a:solidFill>
@@ -10812,7 +10812,7 @@
               </a:ln>
               <a:extLst>
                 <a:ext uri="{91240B29-F687-4f45-9708-019B960494DF}">
-                  <a14:hiddenLine xmlns:a14="http://schemas.microsoft.com/office/drawing/2010/main" xmlns="" w="9525">
+                  <a14:hiddenLine xmlns="" xmlns:a14="http://schemas.microsoft.com/office/drawing/2010/main" w="9525">
                     <a:solidFill>
                       <a:srgbClr val="000000"/>
                     </a:solidFill>
@@ -10877,7 +10877,7 @@
               </a:ln>
               <a:extLst>
                 <a:ext uri="{91240B29-F687-4f45-9708-019B960494DF}">
-                  <a14:hiddenLine xmlns:a14="http://schemas.microsoft.com/office/drawing/2010/main" xmlns="" w="9525">
+                  <a14:hiddenLine xmlns="" xmlns:a14="http://schemas.microsoft.com/office/drawing/2010/main" w="9525">
                     <a:solidFill>
                       <a:srgbClr val="000000"/>
                     </a:solidFill>
@@ -10997,7 +10997,7 @@
               </a:ln>
               <a:extLst>
                 <a:ext uri="{91240B29-F687-4f45-9708-019B960494DF}">
-                  <a14:hiddenLine xmlns:a14="http://schemas.microsoft.com/office/drawing/2010/main" xmlns="" w="9525">
+                  <a14:hiddenLine xmlns="" xmlns:a14="http://schemas.microsoft.com/office/drawing/2010/main" w="9525">
                     <a:solidFill>
                       <a:srgbClr val="000000"/>
                     </a:solidFill>
@@ -11095,7 +11095,7 @@
               </a:ln>
               <a:extLst>
                 <a:ext uri="{91240B29-F687-4f45-9708-019B960494DF}">
-                  <a14:hiddenLine xmlns:a14="http://schemas.microsoft.com/office/drawing/2010/main" xmlns="" w="9525">
+                  <a14:hiddenLine xmlns="" xmlns:a14="http://schemas.microsoft.com/office/drawing/2010/main" w="9525">
                     <a:solidFill>
                       <a:srgbClr val="000000"/>
                     </a:solidFill>
@@ -11210,7 +11210,7 @@
               </a:ln>
               <a:extLst>
                 <a:ext uri="{91240B29-F687-4f45-9708-019B960494DF}">
-                  <a14:hiddenLine xmlns:a14="http://schemas.microsoft.com/office/drawing/2010/main" xmlns="" w="9525">
+                  <a14:hiddenLine xmlns="" xmlns:a14="http://schemas.microsoft.com/office/drawing/2010/main" w="9525">
                     <a:solidFill>
                       <a:srgbClr val="000000"/>
                     </a:solidFill>
@@ -11300,7 +11300,7 @@
               </a:ln>
               <a:extLst>
                 <a:ext uri="{91240B29-F687-4f45-9708-019B960494DF}">
-                  <a14:hiddenLine xmlns:a14="http://schemas.microsoft.com/office/drawing/2010/main" xmlns="" w="9525">
+                  <a14:hiddenLine xmlns="" xmlns:a14="http://schemas.microsoft.com/office/drawing/2010/main" w="9525">
                     <a:solidFill>
                       <a:srgbClr val="000000"/>
                     </a:solidFill>
@@ -11365,7 +11365,7 @@
               </a:ln>
               <a:extLst>
                 <a:ext uri="{91240B29-F687-4f45-9708-019B960494DF}">
-                  <a14:hiddenLine xmlns:a14="http://schemas.microsoft.com/office/drawing/2010/main" xmlns="" w="9525">
+                  <a14:hiddenLine xmlns="" xmlns:a14="http://schemas.microsoft.com/office/drawing/2010/main" w="9525">
                     <a:solidFill>
                       <a:srgbClr val="000000"/>
                     </a:solidFill>
@@ -11455,7 +11455,7 @@
               </a:ln>
               <a:extLst>
                 <a:ext uri="{91240B29-F687-4f45-9708-019B960494DF}">
-                  <a14:hiddenLine xmlns:a14="http://schemas.microsoft.com/office/drawing/2010/main" xmlns="" w="9525">
+                  <a14:hiddenLine xmlns="" xmlns:a14="http://schemas.microsoft.com/office/drawing/2010/main" w="9525">
                     <a:solidFill>
                       <a:srgbClr val="000000"/>
                     </a:solidFill>
@@ -11523,7 +11523,7 @@
               </a:ln>
               <a:extLst>
                 <a:ext uri="{91240B29-F687-4f45-9708-019B960494DF}">
-                  <a14:hiddenLine xmlns:a14="http://schemas.microsoft.com/office/drawing/2010/main" xmlns="" w="9525">
+                  <a14:hiddenLine xmlns="" xmlns:a14="http://schemas.microsoft.com/office/drawing/2010/main" w="9525">
                     <a:solidFill>
                       <a:srgbClr val="000000"/>
                     </a:solidFill>
@@ -11613,7 +11613,7 @@
               </a:ln>
               <a:extLst>
                 <a:ext uri="{91240B29-F687-4f45-9708-019B960494DF}">
-                  <a14:hiddenLine xmlns:a14="http://schemas.microsoft.com/office/drawing/2010/main" xmlns="" w="9525">
+                  <a14:hiddenLine xmlns="" xmlns:a14="http://schemas.microsoft.com/office/drawing/2010/main" w="9525">
                     <a:solidFill>
                       <a:srgbClr val="000000"/>
                     </a:solidFill>
@@ -11681,7 +11681,7 @@
               </a:ln>
               <a:extLst>
                 <a:ext uri="{91240B29-F687-4f45-9708-019B960494DF}">
-                  <a14:hiddenLine xmlns:a14="http://schemas.microsoft.com/office/drawing/2010/main" xmlns="" w="9525">
+                  <a14:hiddenLine xmlns="" xmlns:a14="http://schemas.microsoft.com/office/drawing/2010/main" w="9525">
                     <a:solidFill>
                       <a:srgbClr val="000000"/>
                     </a:solidFill>
@@ -11771,7 +11771,7 @@
               </a:ln>
               <a:extLst>
                 <a:ext uri="{91240B29-F687-4f45-9708-019B960494DF}">
-                  <a14:hiddenLine xmlns:a14="http://schemas.microsoft.com/office/drawing/2010/main" xmlns="" w="9525">
+                  <a14:hiddenLine xmlns="" xmlns:a14="http://schemas.microsoft.com/office/drawing/2010/main" w="9525">
                     <a:solidFill>
                       <a:srgbClr val="000000"/>
                     </a:solidFill>
@@ -11805,7 +11805,7 @@
               </a:ln>
               <a:extLst>
                 <a:ext uri="{91240B29-F687-4f45-9708-019B960494DF}">
-                  <a14:hiddenLine xmlns:a14="http://schemas.microsoft.com/office/drawing/2010/main" xmlns="" w="9525">
+                  <a14:hiddenLine xmlns="" xmlns:a14="http://schemas.microsoft.com/office/drawing/2010/main" w="9525">
                     <a:solidFill>
                       <a:srgbClr val="000000"/>
                     </a:solidFill>
@@ -11946,7 +11946,7 @@
             <a:fld id="{48A87A34-81AB-432B-8DAE-1953F412C126}" type="datetimeFigureOut">
               <a:rPr lang="en-US" dirty="0"/>
               <a:pPr/>
-              <a:t>2/9/2018</a:t>
+              <a:t>2/12/2018</a:t>
             </a:fld>
             <a:endParaRPr lang="en-US" dirty="0"/>
           </a:p>
@@ -14420,7 +14420,7 @@
         </p:nvSpPr>
         <p:spPr>
           <a:xfrm>
-            <a:off x="1141413" y="336430"/>
+            <a:off x="1141413" y="103517"/>
             <a:ext cx="9905998" cy="1311215"/>
           </a:xfrm>
         </p:spPr>
@@ -14448,8 +14448,8 @@
         </p:nvSpPr>
         <p:spPr>
           <a:xfrm>
-            <a:off x="2932982" y="1711454"/>
-            <a:ext cx="5348376" cy="584775"/>
+            <a:off x="746036" y="1718700"/>
+            <a:ext cx="5348376" cy="1077218"/>
           </a:xfrm>
           <a:prstGeom prst="rect">
             <a:avLst/>
@@ -14468,7 +14468,22 @@
             </a:pPr>
             <a:r>
               <a:rPr lang="fr-FR" sz="3200" dirty="0" smtClean="0"/>
-              <a:t>Insertion de l’API </a:t>
+              <a:t>Insertion de </a:t>
+            </a:r>
+            <a:endParaRPr lang="fr-FR" sz="3200" dirty="0" smtClean="0"/>
+          </a:p>
+          <a:p>
+            <a:r>
+              <a:rPr lang="fr-FR" sz="3200" dirty="0"/>
+              <a:t> </a:t>
+            </a:r>
+            <a:r>
+              <a:rPr lang="fr-FR" sz="3200" dirty="0" smtClean="0"/>
+              <a:t> </a:t>
+            </a:r>
+            <a:r>
+              <a:rPr lang="fr-FR" sz="3200" dirty="0" smtClean="0"/>
+              <a:t>l’API </a:t>
             </a:r>
             <a:r>
               <a:rPr lang="fr-FR" sz="3200" dirty="0"/>
@@ -14508,8 +14523,8 @@
         </p:blipFill>
         <p:spPr>
           <a:xfrm>
-            <a:off x="1613841" y="3609440"/>
-            <a:ext cx="3043440" cy="590851"/>
+            <a:off x="1141413" y="2850671"/>
+            <a:ext cx="2484336" cy="482307"/>
           </a:xfrm>
           <a:prstGeom prst="rect">
             <a:avLst/>
@@ -14537,14 +14552,160 @@
         </p:blipFill>
         <p:spPr>
           <a:xfrm>
-            <a:off x="5607170" y="3096882"/>
-            <a:ext cx="4752011" cy="3217136"/>
+            <a:off x="1141413" y="3404033"/>
+            <a:ext cx="4514935" cy="3056634"/>
           </a:xfrm>
           <a:prstGeom prst="rect">
             <a:avLst/>
           </a:prstGeom>
         </p:spPr>
       </p:pic>
+      <p:sp>
+        <p:nvSpPr>
+          <p:cNvPr id="8" name="Flèche courbée vers la gauche 7"/>
+          <p:cNvSpPr/>
+          <p:nvPr/>
+        </p:nvSpPr>
+        <p:spPr>
+          <a:xfrm>
+            <a:off x="4974456" y="1393014"/>
+            <a:ext cx="439947" cy="1448079"/>
+          </a:xfrm>
+          <a:prstGeom prst="curvedLeftArrow">
+            <a:avLst>
+              <a:gd name="adj1" fmla="val 46809"/>
+              <a:gd name="adj2" fmla="val 114706"/>
+              <a:gd name="adj3" fmla="val 48859"/>
+            </a:avLst>
+          </a:prstGeom>
+          <a:solidFill>
+            <a:schemeClr val="tx1"/>
+          </a:solidFill>
+          <a:ln>
+            <a:solidFill>
+              <a:schemeClr val="tx1"/>
+            </a:solidFill>
+          </a:ln>
+        </p:spPr>
+        <p:style>
+          <a:lnRef idx="2">
+            <a:schemeClr val="accent1">
+              <a:shade val="50000"/>
+            </a:schemeClr>
+          </a:lnRef>
+          <a:fillRef idx="1">
+            <a:schemeClr val="accent1"/>
+          </a:fillRef>
+          <a:effectRef idx="0">
+            <a:schemeClr val="accent1"/>
+          </a:effectRef>
+          <a:fontRef idx="minor">
+            <a:schemeClr val="lt1"/>
+          </a:fontRef>
+        </p:style>
+        <p:txBody>
+          <a:bodyPr rtlCol="0" anchor="ctr"/>
+          <a:lstStyle/>
+          <a:p>
+            <a:pPr algn="ctr"/>
+            <a:endParaRPr lang="fr-FR">
+              <a:solidFill>
+                <a:schemeClr val="tx1"/>
+              </a:solidFill>
+            </a:endParaRPr>
+          </a:p>
+        </p:txBody>
+      </p:sp>
+      <p:sp>
+        <p:nvSpPr>
+          <p:cNvPr id="9" name="Flèche courbée vers le haut 8"/>
+          <p:cNvSpPr/>
+          <p:nvPr/>
+        </p:nvSpPr>
+        <p:spPr>
+          <a:xfrm rot="5231854">
+            <a:off x="6255628" y="1872471"/>
+            <a:ext cx="1414732" cy="477471"/>
+          </a:xfrm>
+          <a:prstGeom prst="curvedUpArrow">
+            <a:avLst>
+              <a:gd name="adj1" fmla="val 29381"/>
+              <a:gd name="adj2" fmla="val 80229"/>
+              <a:gd name="adj3" fmla="val 41754"/>
+            </a:avLst>
+          </a:prstGeom>
+          <a:solidFill>
+            <a:schemeClr val="tx1"/>
+          </a:solidFill>
+          <a:ln>
+            <a:solidFill>
+              <a:schemeClr val="tx1"/>
+            </a:solidFill>
+          </a:ln>
+        </p:spPr>
+        <p:style>
+          <a:lnRef idx="2">
+            <a:schemeClr val="accent1">
+              <a:shade val="50000"/>
+            </a:schemeClr>
+          </a:lnRef>
+          <a:fillRef idx="1">
+            <a:schemeClr val="accent1"/>
+          </a:fillRef>
+          <a:effectRef idx="0">
+            <a:schemeClr val="accent1"/>
+          </a:effectRef>
+          <a:fontRef idx="minor">
+            <a:schemeClr val="lt1"/>
+          </a:fontRef>
+        </p:style>
+        <p:txBody>
+          <a:bodyPr rtlCol="0" anchor="ctr"/>
+          <a:lstStyle/>
+          <a:p>
+            <a:pPr algn="ctr"/>
+            <a:endParaRPr lang="fr-FR">
+              <a:solidFill>
+                <a:schemeClr val="tx1"/>
+              </a:solidFill>
+            </a:endParaRPr>
+          </a:p>
+        </p:txBody>
+      </p:sp>
+      <p:sp>
+        <p:nvSpPr>
+          <p:cNvPr id="10" name="ZoneTexte 9"/>
+          <p:cNvSpPr txBox="1"/>
+          <p:nvPr/>
+        </p:nvSpPr>
+        <p:spPr>
+          <a:xfrm>
+            <a:off x="7476822" y="2656936"/>
+            <a:ext cx="3329796" cy="1077218"/>
+          </a:xfrm>
+          <a:prstGeom prst="rect">
+            <a:avLst/>
+          </a:prstGeom>
+          <a:noFill/>
+        </p:spPr>
+        <p:txBody>
+          <a:bodyPr wrap="square" rtlCol="0">
+            <a:spAutoFit/>
+          </a:bodyPr>
+          <a:lstStyle/>
+          <a:p>
+            <a:pPr marL="285750" indent="-285750">
+              <a:buFont typeface="Arial" panose="020B0604020202020204" pitchFamily="34" charset="0"/>
+              <a:buChar char="•"/>
+            </a:pPr>
+            <a:r>
+              <a:rPr lang="fr-FR" sz="3200" dirty="0" smtClean="0"/>
+              <a:t>Mise en ligne du site </a:t>
+            </a:r>
+            <a:endParaRPr lang="fr-FR" sz="3200" dirty="0"/>
+          </a:p>
+        </p:txBody>
+      </p:sp>
     </p:spTree>
     <p:extLst>
       <p:ext uri="{BB962C8B-B14F-4D97-AF65-F5344CB8AC3E}">
@@ -14576,7 +14737,7 @@
                             </p:stCondLst>
                             <p:childTnLst>
                               <p:par>
-                                <p:cTn id="5" presetID="42" presetClass="entr" presetSubtype="0" fill="hold" grpId="0" nodeType="clickEffect">
+                                <p:cTn id="5" presetID="47" presetClass="entr" presetSubtype="0" fill="hold" grpId="0" nodeType="clickEffect">
                                   <p:stCondLst>
                                     <p:cond delay="0"/>
                                   </p:stCondLst>
@@ -14584,6 +14745,105 @@
                                     <p:set>
                                       <p:cBhvr>
                                         <p:cTn id="6" dur="1" fill="hold">
+                                          <p:stCondLst>
+                                            <p:cond delay="0"/>
+                                          </p:stCondLst>
+                                        </p:cTn>
+                                        <p:tgtEl>
+                                          <p:spTgt spid="8"/>
+                                        </p:tgtEl>
+                                        <p:attrNameLst>
+                                          <p:attrName>style.visibility</p:attrName>
+                                        </p:attrNameLst>
+                                      </p:cBhvr>
+                                      <p:to>
+                                        <p:strVal val="visible"/>
+                                      </p:to>
+                                    </p:set>
+                                    <p:animEffect transition="in" filter="fade">
+                                      <p:cBhvr>
+                                        <p:cTn id="7" dur="250"/>
+                                        <p:tgtEl>
+                                          <p:spTgt spid="8"/>
+                                        </p:tgtEl>
+                                      </p:cBhvr>
+                                    </p:animEffect>
+                                    <p:anim calcmode="lin" valueType="num">
+                                      <p:cBhvr>
+                                        <p:cTn id="8" dur="250" fill="hold"/>
+                                        <p:tgtEl>
+                                          <p:spTgt spid="8"/>
+                                        </p:tgtEl>
+                                        <p:attrNameLst>
+                                          <p:attrName>ppt_x</p:attrName>
+                                        </p:attrNameLst>
+                                      </p:cBhvr>
+                                      <p:tavLst>
+                                        <p:tav tm="0">
+                                          <p:val>
+                                            <p:strVal val="#ppt_x"/>
+                                          </p:val>
+                                        </p:tav>
+                                        <p:tav tm="100000">
+                                          <p:val>
+                                            <p:strVal val="#ppt_x"/>
+                                          </p:val>
+                                        </p:tav>
+                                      </p:tavLst>
+                                    </p:anim>
+                                    <p:anim calcmode="lin" valueType="num">
+                                      <p:cBhvr>
+                                        <p:cTn id="9" dur="250" fill="hold"/>
+                                        <p:tgtEl>
+                                          <p:spTgt spid="8"/>
+                                        </p:tgtEl>
+                                        <p:attrNameLst>
+                                          <p:attrName>ppt_y</p:attrName>
+                                        </p:attrNameLst>
+                                      </p:cBhvr>
+                                      <p:tavLst>
+                                        <p:tav tm="0">
+                                          <p:val>
+                                            <p:strVal val="#ppt_y-.1"/>
+                                          </p:val>
+                                        </p:tav>
+                                        <p:tav tm="100000">
+                                          <p:val>
+                                            <p:strVal val="#ppt_y"/>
+                                          </p:val>
+                                        </p:tav>
+                                      </p:tavLst>
+                                    </p:anim>
+                                  </p:childTnLst>
+                                </p:cTn>
+                              </p:par>
+                            </p:childTnLst>
+                          </p:cTn>
+                        </p:par>
+                      </p:childTnLst>
+                    </p:cTn>
+                  </p:par>
+                  <p:par>
+                    <p:cTn id="10" fill="hold">
+                      <p:stCondLst>
+                        <p:cond delay="indefinite"/>
+                      </p:stCondLst>
+                      <p:childTnLst>
+                        <p:par>
+                          <p:cTn id="11" fill="hold">
+                            <p:stCondLst>
+                              <p:cond delay="0"/>
+                            </p:stCondLst>
+                            <p:childTnLst>
+                              <p:par>
+                                <p:cTn id="12" presetID="42" presetClass="entr" presetSubtype="0" fill="hold" grpId="0" nodeType="clickEffect">
+                                  <p:stCondLst>
+                                    <p:cond delay="0"/>
+                                  </p:stCondLst>
+                                  <p:childTnLst>
+                                    <p:set>
+                                      <p:cBhvr>
+                                        <p:cTn id="13" dur="1" fill="hold">
                                           <p:stCondLst>
                                             <p:cond delay="0"/>
                                           </p:stCondLst>
@@ -14601,7 +14861,7 @@
                                     </p:set>
                                     <p:animEffect transition="in" filter="fade">
                                       <p:cBhvr>
-                                        <p:cTn id="7" dur="500"/>
+                                        <p:cTn id="14" dur="250"/>
                                         <p:tgtEl>
                                           <p:spTgt spid="4"/>
                                         </p:tgtEl>
@@ -14609,7 +14869,7 @@
                                     </p:animEffect>
                                     <p:anim calcmode="lin" valueType="num">
                                       <p:cBhvr>
-                                        <p:cTn id="8" dur="500" fill="hold"/>
+                                        <p:cTn id="15" dur="250" fill="hold"/>
                                         <p:tgtEl>
                                           <p:spTgt spid="4"/>
                                         </p:tgtEl>
@@ -14632,7 +14892,7 @@
                                     </p:anim>
                                     <p:anim calcmode="lin" valueType="num">
                                       <p:cBhvr>
-                                        <p:cTn id="9" dur="500" fill="hold"/>
+                                        <p:cTn id="16" dur="250" fill="hold"/>
                                         <p:tgtEl>
                                           <p:spTgt spid="4"/>
                                         </p:tgtEl>
@@ -14657,14 +14917,14 @@
                                 </p:cTn>
                               </p:par>
                               <p:par>
-                                <p:cTn id="10" presetID="42" presetClass="entr" presetSubtype="0" fill="hold" nodeType="withEffect">
+                                <p:cTn id="17" presetID="42" presetClass="entr" presetSubtype="0" fill="hold" nodeType="withEffect">
                                   <p:stCondLst>
                                     <p:cond delay="0"/>
                                   </p:stCondLst>
                                   <p:childTnLst>
                                     <p:set>
                                       <p:cBhvr>
-                                        <p:cTn id="11" dur="1" fill="hold">
+                                        <p:cTn id="18" dur="1" fill="hold">
                                           <p:stCondLst>
                                             <p:cond delay="0"/>
                                           </p:stCondLst>
@@ -14682,7 +14942,7 @@
                                     </p:set>
                                     <p:animEffect transition="in" filter="fade">
                                       <p:cBhvr>
-                                        <p:cTn id="12" dur="500"/>
+                                        <p:cTn id="19" dur="250"/>
                                         <p:tgtEl>
                                           <p:spTgt spid="6"/>
                                         </p:tgtEl>
@@ -14690,7 +14950,7 @@
                                     </p:animEffect>
                                     <p:anim calcmode="lin" valueType="num">
                                       <p:cBhvr>
-                                        <p:cTn id="13" dur="500" fill="hold"/>
+                                        <p:cTn id="20" dur="250" fill="hold"/>
                                         <p:tgtEl>
                                           <p:spTgt spid="6"/>
                                         </p:tgtEl>
@@ -14713,7 +14973,7 @@
                                     </p:anim>
                                     <p:anim calcmode="lin" valueType="num">
                                       <p:cBhvr>
-                                        <p:cTn id="14" dur="500" fill="hold"/>
+                                        <p:cTn id="21" dur="250" fill="hold"/>
                                         <p:tgtEl>
                                           <p:spTgt spid="6"/>
                                         </p:tgtEl>
@@ -14738,14 +14998,14 @@
                                 </p:cTn>
                               </p:par>
                               <p:par>
-                                <p:cTn id="15" presetID="42" presetClass="entr" presetSubtype="0" fill="hold" nodeType="withEffect">
+                                <p:cTn id="22" presetID="42" presetClass="entr" presetSubtype="0" fill="hold" nodeType="withEffect">
                                   <p:stCondLst>
                                     <p:cond delay="0"/>
                                   </p:stCondLst>
                                   <p:childTnLst>
                                     <p:set>
                                       <p:cBhvr>
-                                        <p:cTn id="16" dur="1" fill="hold">
+                                        <p:cTn id="23" dur="1" fill="hold">
                                           <p:stCondLst>
                                             <p:cond delay="0"/>
                                           </p:stCondLst>
@@ -14763,7 +15023,7 @@
                                     </p:set>
                                     <p:animEffect transition="in" filter="fade">
                                       <p:cBhvr>
-                                        <p:cTn id="17" dur="500"/>
+                                        <p:cTn id="24" dur="250"/>
                                         <p:tgtEl>
                                           <p:spTgt spid="7"/>
                                         </p:tgtEl>
@@ -14771,7 +15031,7 @@
                                     </p:animEffect>
                                     <p:anim calcmode="lin" valueType="num">
                                       <p:cBhvr>
-                                        <p:cTn id="18" dur="500" fill="hold"/>
+                                        <p:cTn id="25" dur="250" fill="hold"/>
                                         <p:tgtEl>
                                           <p:spTgt spid="7"/>
                                         </p:tgtEl>
@@ -14794,9 +15054,207 @@
                                     </p:anim>
                                     <p:anim calcmode="lin" valueType="num">
                                       <p:cBhvr>
-                                        <p:cTn id="19" dur="500" fill="hold"/>
+                                        <p:cTn id="26" dur="250" fill="hold"/>
                                         <p:tgtEl>
                                           <p:spTgt spid="7"/>
+                                        </p:tgtEl>
+                                        <p:attrNameLst>
+                                          <p:attrName>ppt_y</p:attrName>
+                                        </p:attrNameLst>
+                                      </p:cBhvr>
+                                      <p:tavLst>
+                                        <p:tav tm="0">
+                                          <p:val>
+                                            <p:strVal val="#ppt_y+.1"/>
+                                          </p:val>
+                                        </p:tav>
+                                        <p:tav tm="100000">
+                                          <p:val>
+                                            <p:strVal val="#ppt_y"/>
+                                          </p:val>
+                                        </p:tav>
+                                      </p:tavLst>
+                                    </p:anim>
+                                  </p:childTnLst>
+                                </p:cTn>
+                              </p:par>
+                            </p:childTnLst>
+                          </p:cTn>
+                        </p:par>
+                      </p:childTnLst>
+                    </p:cTn>
+                  </p:par>
+                  <p:par>
+                    <p:cTn id="27" fill="hold">
+                      <p:stCondLst>
+                        <p:cond delay="indefinite"/>
+                      </p:stCondLst>
+                      <p:childTnLst>
+                        <p:par>
+                          <p:cTn id="28" fill="hold">
+                            <p:stCondLst>
+                              <p:cond delay="0"/>
+                            </p:stCondLst>
+                            <p:childTnLst>
+                              <p:par>
+                                <p:cTn id="29" presetID="47" presetClass="entr" presetSubtype="0" fill="hold" grpId="0" nodeType="clickEffect">
+                                  <p:stCondLst>
+                                    <p:cond delay="0"/>
+                                  </p:stCondLst>
+                                  <p:childTnLst>
+                                    <p:set>
+                                      <p:cBhvr>
+                                        <p:cTn id="30" dur="1" fill="hold">
+                                          <p:stCondLst>
+                                            <p:cond delay="0"/>
+                                          </p:stCondLst>
+                                        </p:cTn>
+                                        <p:tgtEl>
+                                          <p:spTgt spid="9"/>
+                                        </p:tgtEl>
+                                        <p:attrNameLst>
+                                          <p:attrName>style.visibility</p:attrName>
+                                        </p:attrNameLst>
+                                      </p:cBhvr>
+                                      <p:to>
+                                        <p:strVal val="visible"/>
+                                      </p:to>
+                                    </p:set>
+                                    <p:animEffect transition="in" filter="fade">
+                                      <p:cBhvr>
+                                        <p:cTn id="31" dur="250"/>
+                                        <p:tgtEl>
+                                          <p:spTgt spid="9"/>
+                                        </p:tgtEl>
+                                      </p:cBhvr>
+                                    </p:animEffect>
+                                    <p:anim calcmode="lin" valueType="num">
+                                      <p:cBhvr>
+                                        <p:cTn id="32" dur="250" fill="hold"/>
+                                        <p:tgtEl>
+                                          <p:spTgt spid="9"/>
+                                        </p:tgtEl>
+                                        <p:attrNameLst>
+                                          <p:attrName>ppt_x</p:attrName>
+                                        </p:attrNameLst>
+                                      </p:cBhvr>
+                                      <p:tavLst>
+                                        <p:tav tm="0">
+                                          <p:val>
+                                            <p:strVal val="#ppt_x"/>
+                                          </p:val>
+                                        </p:tav>
+                                        <p:tav tm="100000">
+                                          <p:val>
+                                            <p:strVal val="#ppt_x"/>
+                                          </p:val>
+                                        </p:tav>
+                                      </p:tavLst>
+                                    </p:anim>
+                                    <p:anim calcmode="lin" valueType="num">
+                                      <p:cBhvr>
+                                        <p:cTn id="33" dur="250" fill="hold"/>
+                                        <p:tgtEl>
+                                          <p:spTgt spid="9"/>
+                                        </p:tgtEl>
+                                        <p:attrNameLst>
+                                          <p:attrName>ppt_y</p:attrName>
+                                        </p:attrNameLst>
+                                      </p:cBhvr>
+                                      <p:tavLst>
+                                        <p:tav tm="0">
+                                          <p:val>
+                                            <p:strVal val="#ppt_y-.1"/>
+                                          </p:val>
+                                        </p:tav>
+                                        <p:tav tm="100000">
+                                          <p:val>
+                                            <p:strVal val="#ppt_y"/>
+                                          </p:val>
+                                        </p:tav>
+                                      </p:tavLst>
+                                    </p:anim>
+                                  </p:childTnLst>
+                                </p:cTn>
+                              </p:par>
+                            </p:childTnLst>
+                          </p:cTn>
+                        </p:par>
+                      </p:childTnLst>
+                    </p:cTn>
+                  </p:par>
+                  <p:par>
+                    <p:cTn id="34" fill="hold">
+                      <p:stCondLst>
+                        <p:cond delay="indefinite"/>
+                      </p:stCondLst>
+                      <p:childTnLst>
+                        <p:par>
+                          <p:cTn id="35" fill="hold">
+                            <p:stCondLst>
+                              <p:cond delay="0"/>
+                            </p:stCondLst>
+                            <p:childTnLst>
+                              <p:par>
+                                <p:cTn id="36" presetID="42" presetClass="entr" presetSubtype="0" fill="hold" grpId="0" nodeType="clickEffect">
+                                  <p:stCondLst>
+                                    <p:cond delay="0"/>
+                                  </p:stCondLst>
+                                  <p:childTnLst>
+                                    <p:set>
+                                      <p:cBhvr>
+                                        <p:cTn id="37" dur="1" fill="hold">
+                                          <p:stCondLst>
+                                            <p:cond delay="0"/>
+                                          </p:stCondLst>
+                                        </p:cTn>
+                                        <p:tgtEl>
+                                          <p:spTgt spid="10"/>
+                                        </p:tgtEl>
+                                        <p:attrNameLst>
+                                          <p:attrName>style.visibility</p:attrName>
+                                        </p:attrNameLst>
+                                      </p:cBhvr>
+                                      <p:to>
+                                        <p:strVal val="visible"/>
+                                      </p:to>
+                                    </p:set>
+                                    <p:animEffect transition="in" filter="fade">
+                                      <p:cBhvr>
+                                        <p:cTn id="38" dur="250"/>
+                                        <p:tgtEl>
+                                          <p:spTgt spid="10"/>
+                                        </p:tgtEl>
+                                      </p:cBhvr>
+                                    </p:animEffect>
+                                    <p:anim calcmode="lin" valueType="num">
+                                      <p:cBhvr>
+                                        <p:cTn id="39" dur="250" fill="hold"/>
+                                        <p:tgtEl>
+                                          <p:spTgt spid="10"/>
+                                        </p:tgtEl>
+                                        <p:attrNameLst>
+                                          <p:attrName>ppt_x</p:attrName>
+                                        </p:attrNameLst>
+                                      </p:cBhvr>
+                                      <p:tavLst>
+                                        <p:tav tm="0">
+                                          <p:val>
+                                            <p:strVal val="#ppt_x"/>
+                                          </p:val>
+                                        </p:tav>
+                                        <p:tav tm="100000">
+                                          <p:val>
+                                            <p:strVal val="#ppt_x"/>
+                                          </p:val>
+                                        </p:tav>
+                                      </p:tavLst>
+                                    </p:anim>
+                                    <p:anim calcmode="lin" valueType="num">
+                                      <p:cBhvr>
+                                        <p:cTn id="40" dur="250" fill="hold"/>
+                                        <p:tgtEl>
+                                          <p:spTgt spid="10"/>
                                         </p:tgtEl>
                                         <p:attrNameLst>
                                           <p:attrName>ppt_y</p:attrName>
@@ -14847,6 +15305,9 @@
     </p:tnLst>
     <p:bldLst>
       <p:bldP spid="4" grpId="0"/>
+      <p:bldP spid="8" grpId="0" animBg="1"/>
+      <p:bldP spid="9" grpId="0" animBg="1"/>
+      <p:bldP spid="10" grpId="0"/>
     </p:bldLst>
   </p:timing>
 </p:sld>
@@ -19355,7 +19816,7 @@
         </p:nvSpPr>
         <p:spPr>
           <a:xfrm>
-            <a:off x="7744967" y="3035808"/>
+            <a:off x="7653527" y="1863171"/>
             <a:ext cx="3685032" cy="584775"/>
           </a:xfrm>
           <a:prstGeom prst="rect">
@@ -19384,7 +19845,7 @@
         </p:nvSpPr>
         <p:spPr>
           <a:xfrm>
-            <a:off x="7744967" y="3758184"/>
+            <a:off x="7671814" y="2437575"/>
             <a:ext cx="3375596" cy="861774"/>
           </a:xfrm>
           <a:prstGeom prst="rect">
@@ -19420,7 +19881,7 @@
         </p:nvSpPr>
         <p:spPr>
           <a:xfrm>
-            <a:off x="7744967" y="4218950"/>
+            <a:off x="7671814" y="3022350"/>
             <a:ext cx="3502153" cy="861774"/>
           </a:xfrm>
           <a:prstGeom prst="rect">
@@ -19464,7 +19925,7 @@
         </p:nvSpPr>
         <p:spPr>
           <a:xfrm>
-            <a:off x="7744967" y="4688584"/>
+            <a:off x="7671814" y="3550416"/>
             <a:ext cx="2414016" cy="584775"/>
           </a:xfrm>
           <a:prstGeom prst="rect">
@@ -19498,7 +19959,7 @@
         </p:nvSpPr>
         <p:spPr>
           <a:xfrm>
-            <a:off x="7744967" y="5278982"/>
+            <a:off x="7671814" y="4135191"/>
             <a:ext cx="2578609" cy="584775"/>
           </a:xfrm>
           <a:prstGeom prst="rect">
@@ -19527,6 +19988,91 @@
             <a:r>
               <a:rPr lang="fr-FR" sz="3200" dirty="0" smtClean="0"/>
               <a:t>&gt;</a:t>
+            </a:r>
+            <a:endParaRPr lang="fr-FR" sz="3200" dirty="0"/>
+          </a:p>
+        </p:txBody>
+      </p:sp>
+      <p:sp>
+        <p:nvSpPr>
+          <p:cNvPr id="5" name="Flèche vers le bas 4"/>
+          <p:cNvSpPr/>
+          <p:nvPr/>
+        </p:nvSpPr>
+        <p:spPr>
+          <a:xfrm>
+            <a:off x="6652605" y="2478024"/>
+            <a:ext cx="427983" cy="2533923"/>
+          </a:xfrm>
+          <a:prstGeom prst="downArrow">
+            <a:avLst>
+              <a:gd name="adj1" fmla="val 50000"/>
+              <a:gd name="adj2" fmla="val 91026"/>
+            </a:avLst>
+          </a:prstGeom>
+          <a:solidFill>
+            <a:schemeClr val="tx1"/>
+          </a:solidFill>
+          <a:ln>
+            <a:solidFill>
+              <a:schemeClr val="tx1"/>
+            </a:solidFill>
+          </a:ln>
+        </p:spPr>
+        <p:style>
+          <a:lnRef idx="2">
+            <a:schemeClr val="accent1">
+              <a:shade val="50000"/>
+            </a:schemeClr>
+          </a:lnRef>
+          <a:fillRef idx="1">
+            <a:schemeClr val="accent1"/>
+          </a:fillRef>
+          <a:effectRef idx="0">
+            <a:schemeClr val="accent1"/>
+          </a:effectRef>
+          <a:fontRef idx="minor">
+            <a:schemeClr val="lt1"/>
+          </a:fontRef>
+        </p:style>
+        <p:txBody>
+          <a:bodyPr rtlCol="0" anchor="ctr"/>
+          <a:lstStyle/>
+          <a:p>
+            <a:pPr algn="ctr"/>
+            <a:endParaRPr lang="fr-FR"/>
+          </a:p>
+        </p:txBody>
+      </p:sp>
+      <p:sp>
+        <p:nvSpPr>
+          <p:cNvPr id="14" name="ZoneTexte 13"/>
+          <p:cNvSpPr txBox="1"/>
+          <p:nvPr/>
+        </p:nvSpPr>
+        <p:spPr>
+          <a:xfrm>
+            <a:off x="4993268" y="5417388"/>
+            <a:ext cx="3885554" cy="584775"/>
+          </a:xfrm>
+          <a:prstGeom prst="rect">
+            <a:avLst/>
+          </a:prstGeom>
+          <a:noFill/>
+        </p:spPr>
+        <p:txBody>
+          <a:bodyPr wrap="square" rtlCol="0">
+            <a:spAutoFit/>
+          </a:bodyPr>
+          <a:lstStyle/>
+          <a:p>
+            <a:pPr marL="285750" indent="-285750">
+              <a:buFont typeface="Arial" panose="020B0604020202020204" pitchFamily="34" charset="0"/>
+              <a:buChar char="•"/>
+            </a:pPr>
+            <a:r>
+              <a:rPr lang="fr-FR" sz="3200" dirty="0" smtClean="0"/>
+              <a:t>Augmentation du CA</a:t>
             </a:r>
             <a:endParaRPr lang="fr-FR" sz="3200" dirty="0"/>
           </a:p>
@@ -20290,6 +20836,188 @@
                       </p:childTnLst>
                     </p:cTn>
                   </p:par>
+                  <p:par>
+                    <p:cTn id="51" fill="hold">
+                      <p:stCondLst>
+                        <p:cond delay="indefinite"/>
+                      </p:stCondLst>
+                      <p:childTnLst>
+                        <p:par>
+                          <p:cTn id="52" fill="hold">
+                            <p:stCondLst>
+                              <p:cond delay="0"/>
+                            </p:stCondLst>
+                            <p:childTnLst>
+                              <p:par>
+                                <p:cTn id="53" presetID="2" presetClass="entr" presetSubtype="1" fill="hold" grpId="0" nodeType="clickEffect">
+                                  <p:stCondLst>
+                                    <p:cond delay="0"/>
+                                  </p:stCondLst>
+                                  <p:childTnLst>
+                                    <p:set>
+                                      <p:cBhvr>
+                                        <p:cTn id="54" dur="1" fill="hold">
+                                          <p:stCondLst>
+                                            <p:cond delay="0"/>
+                                          </p:stCondLst>
+                                        </p:cTn>
+                                        <p:tgtEl>
+                                          <p:spTgt spid="5"/>
+                                        </p:tgtEl>
+                                        <p:attrNameLst>
+                                          <p:attrName>style.visibility</p:attrName>
+                                        </p:attrNameLst>
+                                      </p:cBhvr>
+                                      <p:to>
+                                        <p:strVal val="visible"/>
+                                      </p:to>
+                                    </p:set>
+                                    <p:anim calcmode="lin" valueType="num">
+                                      <p:cBhvr additive="base">
+                                        <p:cTn id="55" dur="500" fill="hold"/>
+                                        <p:tgtEl>
+                                          <p:spTgt spid="5"/>
+                                        </p:tgtEl>
+                                        <p:attrNameLst>
+                                          <p:attrName>ppt_x</p:attrName>
+                                        </p:attrNameLst>
+                                      </p:cBhvr>
+                                      <p:tavLst>
+                                        <p:tav tm="0">
+                                          <p:val>
+                                            <p:strVal val="#ppt_x"/>
+                                          </p:val>
+                                        </p:tav>
+                                        <p:tav tm="100000">
+                                          <p:val>
+                                            <p:strVal val="#ppt_x"/>
+                                          </p:val>
+                                        </p:tav>
+                                      </p:tavLst>
+                                    </p:anim>
+                                    <p:anim calcmode="lin" valueType="num">
+                                      <p:cBhvr additive="base">
+                                        <p:cTn id="56" dur="500" fill="hold"/>
+                                        <p:tgtEl>
+                                          <p:spTgt spid="5"/>
+                                        </p:tgtEl>
+                                        <p:attrNameLst>
+                                          <p:attrName>ppt_y</p:attrName>
+                                        </p:attrNameLst>
+                                      </p:cBhvr>
+                                      <p:tavLst>
+                                        <p:tav tm="0">
+                                          <p:val>
+                                            <p:strVal val="0-#ppt_h/2"/>
+                                          </p:val>
+                                        </p:tav>
+                                        <p:tav tm="100000">
+                                          <p:val>
+                                            <p:strVal val="#ppt_y"/>
+                                          </p:val>
+                                        </p:tav>
+                                      </p:tavLst>
+                                    </p:anim>
+                                  </p:childTnLst>
+                                </p:cTn>
+                              </p:par>
+                            </p:childTnLst>
+                          </p:cTn>
+                        </p:par>
+                      </p:childTnLst>
+                    </p:cTn>
+                  </p:par>
+                  <p:par>
+                    <p:cTn id="57" fill="hold">
+                      <p:stCondLst>
+                        <p:cond delay="indefinite"/>
+                      </p:stCondLst>
+                      <p:childTnLst>
+                        <p:par>
+                          <p:cTn id="58" fill="hold">
+                            <p:stCondLst>
+                              <p:cond delay="0"/>
+                            </p:stCondLst>
+                            <p:childTnLst>
+                              <p:par>
+                                <p:cTn id="59" presetID="2" presetClass="entr" presetSubtype="4" fill="hold" grpId="0" nodeType="clickEffect">
+                                  <p:stCondLst>
+                                    <p:cond delay="0"/>
+                                  </p:stCondLst>
+                                  <p:childTnLst>
+                                    <p:set>
+                                      <p:cBhvr>
+                                        <p:cTn id="60" dur="1" fill="hold">
+                                          <p:stCondLst>
+                                            <p:cond delay="0"/>
+                                          </p:stCondLst>
+                                        </p:cTn>
+                                        <p:tgtEl>
+                                          <p:spTgt spid="14"/>
+                                        </p:tgtEl>
+                                        <p:attrNameLst>
+                                          <p:attrName>style.visibility</p:attrName>
+                                        </p:attrNameLst>
+                                      </p:cBhvr>
+                                      <p:to>
+                                        <p:strVal val="visible"/>
+                                      </p:to>
+                                    </p:set>
+                                    <p:anim calcmode="lin" valueType="num">
+                                      <p:cBhvr additive="base">
+                                        <p:cTn id="61" dur="500" fill="hold"/>
+                                        <p:tgtEl>
+                                          <p:spTgt spid="14"/>
+                                        </p:tgtEl>
+                                        <p:attrNameLst>
+                                          <p:attrName>ppt_x</p:attrName>
+                                        </p:attrNameLst>
+                                      </p:cBhvr>
+                                      <p:tavLst>
+                                        <p:tav tm="0">
+                                          <p:val>
+                                            <p:strVal val="#ppt_x"/>
+                                          </p:val>
+                                        </p:tav>
+                                        <p:tav tm="100000">
+                                          <p:val>
+                                            <p:strVal val="#ppt_x"/>
+                                          </p:val>
+                                        </p:tav>
+                                      </p:tavLst>
+                                    </p:anim>
+                                    <p:anim calcmode="lin" valueType="num">
+                                      <p:cBhvr additive="base">
+                                        <p:cTn id="62" dur="500" fill="hold"/>
+                                        <p:tgtEl>
+                                          <p:spTgt spid="14"/>
+                                        </p:tgtEl>
+                                        <p:attrNameLst>
+                                          <p:attrName>ppt_y</p:attrName>
+                                        </p:attrNameLst>
+                                      </p:cBhvr>
+                                      <p:tavLst>
+                                        <p:tav tm="0">
+                                          <p:val>
+                                            <p:strVal val="1+#ppt_h/2"/>
+                                          </p:val>
+                                        </p:tav>
+                                        <p:tav tm="100000">
+                                          <p:val>
+                                            <p:strVal val="#ppt_y"/>
+                                          </p:val>
+                                        </p:tav>
+                                      </p:tavLst>
+                                    </p:anim>
+                                  </p:childTnLst>
+                                </p:cTn>
+                              </p:par>
+                            </p:childTnLst>
+                          </p:cTn>
+                        </p:par>
+                      </p:childTnLst>
+                    </p:cTn>
+                  </p:par>
                 </p:childTnLst>
               </p:cTn>
               <p:prevCondLst>
@@ -20318,6 +21046,8 @@
       <p:bldP spid="10" grpId="0"/>
       <p:bldP spid="11" grpId="0"/>
       <p:bldP spid="12" grpId="0"/>
+      <p:bldP spid="5" grpId="0" animBg="1"/>
+      <p:bldP spid="14" grpId="0"/>
     </p:bldLst>
   </p:timing>
 </p:sld>

</xml_diff>